<commit_message>
Update Automating Fabric Solution Deployment.pptx
</commit_message>
<xml_diff>
--- a/docs/Automating Fabric Solution Deployment.pptx
+++ b/docs/Automating Fabric Solution Deployment.pptx
@@ -4037,7 +4037,7 @@
           <a:p>
             <a:fld id="{DCE60099-03E7-4FA1-8A7F-E6E6CFB0F855}" type="datetime8">
               <a:rPr lang="en-US" smtClean="0"/>
-              <a:t>2/5/2025 12:50 PM</a:t>
+              <a:t>2/5/2025 12:51 PM</a:t>
             </a:fld>
             <a:endParaRPr lang="en-US"/>
           </a:p>
@@ -34783,6 +34783,15 @@
 </file>
 
 <file path=customXml/item1.xml><?xml version="1.0" encoding="utf-8"?>
+<?mso-contentType ?>
+<FormTemplates xmlns="http://schemas.microsoft.com/sharepoint/v3/contenttype/forms">
+  <Display>DocumentLibraryForm</Display>
+  <Edit>DocumentLibraryForm</Edit>
+  <New>DocumentLibraryForm</New>
+</FormTemplates>
+</file>
+
+<file path=customXml/item2.xml><?xml version="1.0" encoding="utf-8"?>
 <p:properties xmlns:p="http://schemas.microsoft.com/office/2006/metadata/properties" xmlns:xsi="http://www.w3.org/2001/XMLSchema-instance" xmlns:pc="http://schemas.microsoft.com/office/infopath/2007/PartnerControls">
   <documentManagement>
     <_ip_UnifiedCompliancePolicyUIAction xmlns="http://schemas.microsoft.com/sharepoint/v3" xsi:nil="true"/>
@@ -34790,15 +34799,6 @@
     <_activity xmlns="3c10a0e8-556e-4c2d-9121-1181542ea83c" xsi:nil="true"/>
   </documentManagement>
 </p:properties>
-</file>
-
-<file path=customXml/item2.xml><?xml version="1.0" encoding="utf-8"?>
-<?mso-contentType ?>
-<FormTemplates xmlns="http://schemas.microsoft.com/sharepoint/v3/contenttype/forms">
-  <Display>DocumentLibraryForm</Display>
-  <Edit>DocumentLibraryForm</Edit>
-  <New>DocumentLibraryForm</New>
-</FormTemplates>
 </file>
 
 <file path=customXml/item3.xml><?xml version="1.0" encoding="utf-8"?>
@@ -35066,6 +35066,14 @@
 </file>
 
 <file path=customXml/itemProps1.xml><?xml version="1.0" encoding="utf-8"?>
+<ds:datastoreItem xmlns:ds="http://schemas.openxmlformats.org/officeDocument/2006/customXml" ds:itemID="{758FDAC0-319D-4A54-8D8E-1D42CB1F8004}">
+  <ds:schemaRefs>
+    <ds:schemaRef ds:uri="http://schemas.microsoft.com/sharepoint/v3/contenttype/forms"/>
+  </ds:schemaRefs>
+</ds:datastoreItem>
+</file>
+
+<file path=customXml/itemProps2.xml><?xml version="1.0" encoding="utf-8"?>
 <ds:datastoreItem xmlns:ds="http://schemas.openxmlformats.org/officeDocument/2006/customXml" ds:itemID="{F990F116-B58F-4255-B05B-DA3808E0E5C6}">
   <ds:schemaRefs>
     <ds:schemaRef ds:uri="http://schemas.microsoft.com/sharepoint/v3"/>
@@ -35079,14 +35087,6 @@
     <ds:schemaRef ds:uri="http://schemas.openxmlformats.org/package/2006/metadata/core-properties"/>
     <ds:schemaRef ds:uri="91f22b01-9196-48cc-8d58-ee179122dd75"/>
     <ds:schemaRef ds:uri="http://www.w3.org/XML/1998/namespace"/>
-  </ds:schemaRefs>
-</ds:datastoreItem>
-</file>
-
-<file path=customXml/itemProps2.xml><?xml version="1.0" encoding="utf-8"?>
-<ds:datastoreItem xmlns:ds="http://schemas.openxmlformats.org/officeDocument/2006/customXml" ds:itemID="{758FDAC0-319D-4A54-8D8E-1D42CB1F8004}">
-  <ds:schemaRefs>
-    <ds:schemaRef ds:uri="http://schemas.microsoft.com/sharepoint/v3/contenttype/forms"/>
   </ds:schemaRefs>
 </ds:datastoreItem>
 </file>

</xml_diff>